<commit_message>
Bugs fixed when generate USP.
</commit_message>
<xml_diff>
--- a/DOCS/Intro.pptx
+++ b/DOCS/Intro.pptx
@@ -6,8 +6,13 @@
   </p:sldMasterIdLst>
   <p:sldIdLst>
     <p:sldId id="258" r:id="rId2"/>
-    <p:sldId id="257" r:id="rId3"/>
-    <p:sldId id="259" r:id="rId4"/>
+    <p:sldId id="264" r:id="rId3"/>
+    <p:sldId id="257" r:id="rId4"/>
+    <p:sldId id="261" r:id="rId5"/>
+    <p:sldId id="262" r:id="rId6"/>
+    <p:sldId id="263" r:id="rId7"/>
+    <p:sldId id="259" r:id="rId8"/>
+    <p:sldId id="260" r:id="rId9"/>
   </p:sldIdLst>
   <p:sldSz cx="12192000" cy="6858000"/>
   <p:notesSz cx="6858000" cy="9144000"/>
@@ -273,7 +278,7 @@
           <a:p>
             <a:fld id="{EF6EAEBE-D73E-42DB-BEEC-0E1D1642DD0E}" type="datetimeFigureOut">
               <a:rPr lang="en-US" smtClean="0"/>
-              <a:t>11/17/2019</a:t>
+              <a:t>11/18/2019</a:t>
             </a:fld>
             <a:endParaRPr lang="en-US"/>
           </a:p>
@@ -471,7 +476,7 @@
           <a:p>
             <a:fld id="{EF6EAEBE-D73E-42DB-BEEC-0E1D1642DD0E}" type="datetimeFigureOut">
               <a:rPr lang="en-US" smtClean="0"/>
-              <a:t>11/17/2019</a:t>
+              <a:t>11/18/2019</a:t>
             </a:fld>
             <a:endParaRPr lang="en-US"/>
           </a:p>
@@ -679,7 +684,7 @@
           <a:p>
             <a:fld id="{EF6EAEBE-D73E-42DB-BEEC-0E1D1642DD0E}" type="datetimeFigureOut">
               <a:rPr lang="en-US" smtClean="0"/>
-              <a:t>11/17/2019</a:t>
+              <a:t>11/18/2019</a:t>
             </a:fld>
             <a:endParaRPr lang="en-US"/>
           </a:p>
@@ -877,7 +882,7 @@
           <a:p>
             <a:fld id="{EF6EAEBE-D73E-42DB-BEEC-0E1D1642DD0E}" type="datetimeFigureOut">
               <a:rPr lang="en-US" smtClean="0"/>
-              <a:t>11/17/2019</a:t>
+              <a:t>11/18/2019</a:t>
             </a:fld>
             <a:endParaRPr lang="en-US"/>
           </a:p>
@@ -1152,7 +1157,7 @@
           <a:p>
             <a:fld id="{EF6EAEBE-D73E-42DB-BEEC-0E1D1642DD0E}" type="datetimeFigureOut">
               <a:rPr lang="en-US" smtClean="0"/>
-              <a:t>11/17/2019</a:t>
+              <a:t>11/18/2019</a:t>
             </a:fld>
             <a:endParaRPr lang="en-US"/>
           </a:p>
@@ -1417,7 +1422,7 @@
           <a:p>
             <a:fld id="{EF6EAEBE-D73E-42DB-BEEC-0E1D1642DD0E}" type="datetimeFigureOut">
               <a:rPr lang="en-US" smtClean="0"/>
-              <a:t>11/17/2019</a:t>
+              <a:t>11/18/2019</a:t>
             </a:fld>
             <a:endParaRPr lang="en-US"/>
           </a:p>
@@ -1829,7 +1834,7 @@
           <a:p>
             <a:fld id="{EF6EAEBE-D73E-42DB-BEEC-0E1D1642DD0E}" type="datetimeFigureOut">
               <a:rPr lang="en-US" smtClean="0"/>
-              <a:t>11/17/2019</a:t>
+              <a:t>11/18/2019</a:t>
             </a:fld>
             <a:endParaRPr lang="en-US"/>
           </a:p>
@@ -1970,7 +1975,7 @@
           <a:p>
             <a:fld id="{EF6EAEBE-D73E-42DB-BEEC-0E1D1642DD0E}" type="datetimeFigureOut">
               <a:rPr lang="en-US" smtClean="0"/>
-              <a:t>11/17/2019</a:t>
+              <a:t>11/18/2019</a:t>
             </a:fld>
             <a:endParaRPr lang="en-US"/>
           </a:p>
@@ -2083,7 +2088,7 @@
           <a:p>
             <a:fld id="{EF6EAEBE-D73E-42DB-BEEC-0E1D1642DD0E}" type="datetimeFigureOut">
               <a:rPr lang="en-US" smtClean="0"/>
-              <a:t>11/17/2019</a:t>
+              <a:t>11/18/2019</a:t>
             </a:fld>
             <a:endParaRPr lang="en-US"/>
           </a:p>
@@ -2394,7 +2399,7 @@
           <a:p>
             <a:fld id="{EF6EAEBE-D73E-42DB-BEEC-0E1D1642DD0E}" type="datetimeFigureOut">
               <a:rPr lang="en-US" smtClean="0"/>
-              <a:t>11/17/2019</a:t>
+              <a:t>11/18/2019</a:t>
             </a:fld>
             <a:endParaRPr lang="en-US"/>
           </a:p>
@@ -2682,7 +2687,7 @@
           <a:p>
             <a:fld id="{EF6EAEBE-D73E-42DB-BEEC-0E1D1642DD0E}" type="datetimeFigureOut">
               <a:rPr lang="en-US" smtClean="0"/>
-              <a:t>11/17/2019</a:t>
+              <a:t>11/18/2019</a:t>
             </a:fld>
             <a:endParaRPr lang="en-US"/>
           </a:p>
@@ -2923,7 +2928,7 @@
           <a:p>
             <a:fld id="{EF6EAEBE-D73E-42DB-BEEC-0E1D1642DD0E}" type="datetimeFigureOut">
               <a:rPr lang="en-US" smtClean="0"/>
-              <a:t>11/17/2019</a:t>
+              <a:t>11/18/2019</a:t>
             </a:fld>
             <a:endParaRPr lang="en-US"/>
           </a:p>
@@ -3670,80 +3675,6 @@
       </p:sp>
       <p:sp>
         <p:nvSpPr>
-          <p:cNvPr id="9" name="TextBox 8">
-            <a:extLst>
-              <a:ext uri="{FF2B5EF4-FFF2-40B4-BE49-F238E27FC236}">
-                <a16:creationId xmlns:a16="http://schemas.microsoft.com/office/drawing/2014/main" id="{3F4B903F-E46E-4741-8A19-C3436B314CF4}"/>
-              </a:ext>
-            </a:extLst>
-          </p:cNvPr>
-          <p:cNvSpPr txBox="1"/>
-          <p:nvPr/>
-        </p:nvSpPr>
-        <p:spPr>
-          <a:xfrm>
-            <a:off x="8117539" y="4339971"/>
-            <a:ext cx="2283638" cy="338554"/>
-          </a:xfrm>
-          <a:prstGeom prst="rect">
-            <a:avLst/>
-          </a:prstGeom>
-          <a:noFill/>
-        </p:spPr>
-        <p:txBody>
-          <a:bodyPr wrap="none" rtlCol="0">
-            <a:spAutoFit/>
-          </a:bodyPr>
-          <a:lstStyle/>
-          <a:p>
-            <a:r>
-              <a:rPr lang="en-US" sz="1600" dirty="0"/>
-              <a:t>The demo is for this layer</a:t>
-            </a:r>
-          </a:p>
-        </p:txBody>
-      </p:sp>
-      <p:cxnSp>
-        <p:nvCxnSpPr>
-          <p:cNvPr id="11" name="Straight Arrow Connector 10">
-            <a:extLst>
-              <a:ext uri="{FF2B5EF4-FFF2-40B4-BE49-F238E27FC236}">
-                <a16:creationId xmlns:a16="http://schemas.microsoft.com/office/drawing/2014/main" id="{9B84728E-1DFB-4576-9B50-331C475F95D5}"/>
-              </a:ext>
-            </a:extLst>
-          </p:cNvPr>
-          <p:cNvCxnSpPr/>
-          <p:nvPr/>
-        </p:nvCxnSpPr>
-        <p:spPr>
-          <a:xfrm flipH="1">
-            <a:off x="6883194" y="4509248"/>
-            <a:ext cx="1122286" cy="0"/>
-          </a:xfrm>
-          <a:prstGeom prst="straightConnector1">
-            <a:avLst/>
-          </a:prstGeom>
-          <a:ln>
-            <a:tailEnd type="triangle"/>
-          </a:ln>
-        </p:spPr>
-        <p:style>
-          <a:lnRef idx="3">
-            <a:schemeClr val="dk1"/>
-          </a:lnRef>
-          <a:fillRef idx="0">
-            <a:schemeClr val="dk1"/>
-          </a:fillRef>
-          <a:effectRef idx="2">
-            <a:schemeClr val="dk1"/>
-          </a:effectRef>
-          <a:fontRef idx="minor">
-            <a:schemeClr val="tx1"/>
-          </a:fontRef>
-        </p:style>
-      </p:cxnSp>
-      <p:sp>
-        <p:nvSpPr>
           <p:cNvPr id="10" name="TextBox 9">
             <a:extLst>
               <a:ext uri="{FF2B5EF4-FFF2-40B4-BE49-F238E27FC236}">
@@ -3838,6 +3769,223 @@
 </file>
 
 <file path=ppt/slides/slide2.xml><?xml version="1.0" encoding="utf-8"?>
+<p:sld xmlns:a="http://schemas.openxmlformats.org/drawingml/2006/main" xmlns:r="http://schemas.openxmlformats.org/officeDocument/2006/relationships" xmlns:p="http://schemas.openxmlformats.org/presentationml/2006/main">
+  <p:cSld>
+    <p:spTree>
+      <p:nvGrpSpPr>
+        <p:cNvPr id="1" name=""/>
+        <p:cNvGrpSpPr/>
+        <p:nvPr/>
+      </p:nvGrpSpPr>
+      <p:grpSpPr>
+        <a:xfrm>
+          <a:off x="0" y="0"/>
+          <a:ext cx="0" cy="0"/>
+          <a:chOff x="0" y="0"/>
+          <a:chExt cx="0" cy="0"/>
+        </a:xfrm>
+      </p:grpSpPr>
+      <p:graphicFrame>
+        <p:nvGraphicFramePr>
+          <p:cNvPr id="4" name="Object 3" hidden="1"/>
+          <p:cNvGraphicFramePr>
+            <a:graphicFrameLocks noChangeAspect="1"/>
+          </p:cNvGraphicFramePr>
+          <p:nvPr>
+            <p:custDataLst>
+              <p:tags r:id="rId2"/>
+            </p:custDataLst>
+          </p:nvPr>
+        </p:nvGraphicFramePr>
+        <p:xfrm>
+          <a:off x="1588" y="1588"/>
+          <a:ext cx="1588" cy="1588"/>
+        </p:xfrm>
+        <a:graphic>
+          <a:graphicData uri="http://schemas.openxmlformats.org/presentationml/2006/ole">
+            <mc:AlternateContent xmlns:mc="http://schemas.openxmlformats.org/markup-compatibility/2006">
+              <mc:Choice xmlns:v="urn:schemas-microsoft-com:vml" Requires="v">
+                <p:oleObj spid="_x0000_s1029" name="think-cell Slide" r:id="rId4" imgW="473" imgH="473" progId="TCLayout.ActiveDocument.1">
+                  <p:embed/>
+                </p:oleObj>
+              </mc:Choice>
+              <mc:Fallback>
+                <p:oleObj name="think-cell Slide" r:id="rId4" imgW="473" imgH="473" progId="TCLayout.ActiveDocument.1">
+                  <p:embed/>
+                  <p:pic>
+                    <p:nvPicPr>
+                      <p:cNvPr id="4" name="Object 3" hidden="1"/>
+                      <p:cNvPicPr/>
+                      <p:nvPr/>
+                    </p:nvPicPr>
+                    <p:blipFill>
+                      <a:blip r:embed="rId5"/>
+                      <a:stretch>
+                        <a:fillRect/>
+                      </a:stretch>
+                    </p:blipFill>
+                    <p:spPr>
+                      <a:xfrm>
+                        <a:off x="1588" y="1588"/>
+                        <a:ext cx="1588" cy="1588"/>
+                      </a:xfrm>
+                      <a:prstGeom prst="rect">
+                        <a:avLst/>
+                      </a:prstGeom>
+                    </p:spPr>
+                  </p:pic>
+                </p:oleObj>
+              </mc:Fallback>
+            </mc:AlternateContent>
+          </a:graphicData>
+        </a:graphic>
+      </p:graphicFrame>
+      <p:sp>
+        <p:nvSpPr>
+          <p:cNvPr id="2" name="Title 1"/>
+          <p:cNvSpPr>
+            <a:spLocks noGrp="1"/>
+          </p:cNvSpPr>
+          <p:nvPr>
+            <p:ph type="title"/>
+          </p:nvPr>
+        </p:nvSpPr>
+        <p:spPr/>
+        <p:txBody>
+          <a:bodyPr/>
+          <a:lstStyle/>
+          <a:p>
+            <a:r>
+              <a:rPr lang="en-US" dirty="0"/>
+              <a:t>Difference</a:t>
+            </a:r>
+          </a:p>
+        </p:txBody>
+      </p:sp>
+      <p:sp>
+        <p:nvSpPr>
+          <p:cNvPr id="3" name="Content Placeholder 2"/>
+          <p:cNvSpPr>
+            <a:spLocks noGrp="1"/>
+          </p:cNvSpPr>
+          <p:nvPr>
+            <p:ph idx="1"/>
+          </p:nvPr>
+        </p:nvSpPr>
+        <p:spPr/>
+        <p:txBody>
+          <a:bodyPr>
+            <a:normAutofit lnSpcReduction="10000"/>
+          </a:bodyPr>
+          <a:lstStyle/>
+          <a:p>
+            <a:r>
+              <a:rPr lang="en-US" dirty="0"/>
+              <a:t>Insert only DWH.</a:t>
+            </a:r>
+          </a:p>
+          <a:p>
+            <a:pPr lvl="1"/>
+            <a:r>
+              <a:rPr lang="en-US" dirty="0"/>
+              <a:t>Time stamp: LOAD_DTS</a:t>
+            </a:r>
+          </a:p>
+          <a:p>
+            <a:pPr lvl="1"/>
+            <a:r>
+              <a:rPr lang="en-US" dirty="0"/>
+              <a:t>Updated data from source, insert new one directly.</a:t>
+            </a:r>
+          </a:p>
+          <a:p>
+            <a:pPr lvl="1"/>
+            <a:r>
+              <a:rPr lang="en-US" dirty="0"/>
+              <a:t>Indicator will be added, I for insert, U for update and D for delete.</a:t>
+            </a:r>
+          </a:p>
+          <a:p>
+            <a:pPr lvl="1"/>
+            <a:r>
+              <a:rPr lang="en-US" dirty="0"/>
+              <a:t>Calculate period information by LOAD_DTS.</a:t>
+            </a:r>
+          </a:p>
+          <a:p>
+            <a:r>
+              <a:rPr lang="en-US" dirty="0"/>
+              <a:t>Updateable DWH.(Merge)</a:t>
+            </a:r>
+          </a:p>
+          <a:p>
+            <a:pPr lvl="1"/>
+            <a:r>
+              <a:rPr lang="en-US" dirty="0"/>
+              <a:t>Time stamp: LOAD_DTS, LOAD_END_DTS, IS_CURRENT</a:t>
+            </a:r>
+          </a:p>
+          <a:p>
+            <a:pPr lvl="1"/>
+            <a:r>
+              <a:rPr lang="en-US" dirty="0"/>
+              <a:t>Updated data from source, insert new one, then </a:t>
+            </a:r>
+            <a:r>
+              <a:rPr lang="en-US" dirty="0">
+                <a:solidFill>
+                  <a:srgbClr val="FF0000"/>
+                </a:solidFill>
+              </a:rPr>
+              <a:t>update old record LOAD_END_DTS</a:t>
+            </a:r>
+            <a:r>
+              <a:rPr lang="en-US" dirty="0"/>
+              <a:t>.</a:t>
+            </a:r>
+          </a:p>
+          <a:p>
+            <a:pPr lvl="1"/>
+            <a:r>
+              <a:rPr lang="en-US" dirty="0"/>
+              <a:t>For performance purpose, IS_CURRENT in </a:t>
+            </a:r>
+            <a:r>
+              <a:rPr lang="en-US" dirty="0">
+                <a:solidFill>
+                  <a:srgbClr val="FF0000"/>
+                </a:solidFill>
+              </a:rPr>
+              <a:t>old record will also set to 0</a:t>
+            </a:r>
+            <a:r>
+              <a:rPr lang="en-US" dirty="0"/>
+              <a:t>, then new record set to 1.</a:t>
+            </a:r>
+          </a:p>
+          <a:p>
+            <a:pPr lvl="1"/>
+            <a:r>
+              <a:rPr lang="en-US" dirty="0"/>
+              <a:t>Get period information directly.</a:t>
+            </a:r>
+          </a:p>
+        </p:txBody>
+      </p:sp>
+    </p:spTree>
+    <p:extLst>
+      <p:ext uri="{BB962C8B-B14F-4D97-AF65-F5344CB8AC3E}">
+        <p14:creationId xmlns:p14="http://schemas.microsoft.com/office/powerpoint/2010/main" val="2905360239"/>
+      </p:ext>
+    </p:extLst>
+  </p:cSld>
+  <p:clrMapOvr>
+    <a:masterClrMapping/>
+  </p:clrMapOvr>
+</p:sld>
+</file>
+
+<file path=ppt/slides/slide3.xml><?xml version="1.0" encoding="utf-8"?>
 <p:sld xmlns:a="http://schemas.openxmlformats.org/drawingml/2006/main" xmlns:r="http://schemas.openxmlformats.org/officeDocument/2006/relationships" xmlns:p="http://schemas.openxmlformats.org/presentationml/2006/main">
   <p:cSld>
     <p:spTree>
@@ -4627,7 +4775,7 @@
 </p:sld>
 </file>
 
-<file path=ppt/slides/slide3.xml><?xml version="1.0" encoding="utf-8"?>
+<file path=ppt/slides/slide4.xml><?xml version="1.0" encoding="utf-8"?>
 <p:sld xmlns:a="http://schemas.openxmlformats.org/drawingml/2006/main" xmlns:r="http://schemas.openxmlformats.org/officeDocument/2006/relationships" xmlns:p="http://schemas.openxmlformats.org/presentationml/2006/main">
   <p:cSld>
     <p:spTree>
@@ -4644,6 +4792,186 @@
           <a:chExt cx="0" cy="0"/>
         </a:xfrm>
       </p:grpSpPr>
+      <p:pic>
+        <p:nvPicPr>
+          <p:cNvPr id="2" name="Picture 1">
+            <a:extLst>
+              <a:ext uri="{FF2B5EF4-FFF2-40B4-BE49-F238E27FC236}">
+                <a16:creationId xmlns:a16="http://schemas.microsoft.com/office/drawing/2014/main" id="{5FC34693-D55D-4A12-896E-7B2FE2177C8B}"/>
+              </a:ext>
+            </a:extLst>
+          </p:cNvPr>
+          <p:cNvPicPr>
+            <a:picLocks noChangeAspect="1"/>
+          </p:cNvPicPr>
+          <p:nvPr/>
+        </p:nvPicPr>
+        <p:blipFill>
+          <a:blip r:embed="rId2"/>
+          <a:stretch>
+            <a:fillRect/>
+          </a:stretch>
+        </p:blipFill>
+        <p:spPr>
+          <a:xfrm>
+            <a:off x="0" y="0"/>
+            <a:ext cx="12192000" cy="6858000"/>
+          </a:xfrm>
+          <a:prstGeom prst="rect">
+            <a:avLst/>
+          </a:prstGeom>
+        </p:spPr>
+      </p:pic>
+    </p:spTree>
+    <p:extLst>
+      <p:ext uri="{BB962C8B-B14F-4D97-AF65-F5344CB8AC3E}">
+        <p14:creationId xmlns:p14="http://schemas.microsoft.com/office/powerpoint/2010/main" val="3436858168"/>
+      </p:ext>
+    </p:extLst>
+  </p:cSld>
+  <p:clrMapOvr>
+    <a:masterClrMapping/>
+  </p:clrMapOvr>
+</p:sld>
+</file>
+
+<file path=ppt/slides/slide5.xml><?xml version="1.0" encoding="utf-8"?>
+<p:sld xmlns:a="http://schemas.openxmlformats.org/drawingml/2006/main" xmlns:r="http://schemas.openxmlformats.org/officeDocument/2006/relationships" xmlns:p="http://schemas.openxmlformats.org/presentationml/2006/main">
+  <p:cSld>
+    <p:spTree>
+      <p:nvGrpSpPr>
+        <p:cNvPr id="1" name=""/>
+        <p:cNvGrpSpPr/>
+        <p:nvPr/>
+      </p:nvGrpSpPr>
+      <p:grpSpPr>
+        <a:xfrm>
+          <a:off x="0" y="0"/>
+          <a:ext cx="0" cy="0"/>
+          <a:chOff x="0" y="0"/>
+          <a:chExt cx="0" cy="0"/>
+        </a:xfrm>
+      </p:grpSpPr>
+      <p:pic>
+        <p:nvPicPr>
+          <p:cNvPr id="2" name="Picture 1">
+            <a:extLst>
+              <a:ext uri="{FF2B5EF4-FFF2-40B4-BE49-F238E27FC236}">
+                <a16:creationId xmlns:a16="http://schemas.microsoft.com/office/drawing/2014/main" id="{E28676AB-707B-459F-89B0-60186F4EA495}"/>
+              </a:ext>
+            </a:extLst>
+          </p:cNvPr>
+          <p:cNvPicPr>
+            <a:picLocks noChangeAspect="1"/>
+          </p:cNvPicPr>
+          <p:nvPr/>
+        </p:nvPicPr>
+        <p:blipFill>
+          <a:blip r:embed="rId2"/>
+          <a:stretch>
+            <a:fillRect/>
+          </a:stretch>
+        </p:blipFill>
+        <p:spPr>
+          <a:xfrm>
+            <a:off x="0" y="0"/>
+            <a:ext cx="12192000" cy="6858000"/>
+          </a:xfrm>
+          <a:prstGeom prst="rect">
+            <a:avLst/>
+          </a:prstGeom>
+        </p:spPr>
+      </p:pic>
+    </p:spTree>
+    <p:extLst>
+      <p:ext uri="{BB962C8B-B14F-4D97-AF65-F5344CB8AC3E}">
+        <p14:creationId xmlns:p14="http://schemas.microsoft.com/office/powerpoint/2010/main" val="323962104"/>
+      </p:ext>
+    </p:extLst>
+  </p:cSld>
+  <p:clrMapOvr>
+    <a:masterClrMapping/>
+  </p:clrMapOvr>
+</p:sld>
+</file>
+
+<file path=ppt/slides/slide6.xml><?xml version="1.0" encoding="utf-8"?>
+<p:sld xmlns:a="http://schemas.openxmlformats.org/drawingml/2006/main" xmlns:r="http://schemas.openxmlformats.org/officeDocument/2006/relationships" xmlns:p="http://schemas.openxmlformats.org/presentationml/2006/main">
+  <p:cSld>
+    <p:spTree>
+      <p:nvGrpSpPr>
+        <p:cNvPr id="1" name=""/>
+        <p:cNvGrpSpPr/>
+        <p:nvPr/>
+      </p:nvGrpSpPr>
+      <p:grpSpPr>
+        <a:xfrm>
+          <a:off x="0" y="0"/>
+          <a:ext cx="0" cy="0"/>
+          <a:chOff x="0" y="0"/>
+          <a:chExt cx="0" cy="0"/>
+        </a:xfrm>
+      </p:grpSpPr>
+      <p:pic>
+        <p:nvPicPr>
+          <p:cNvPr id="2" name="Picture 1">
+            <a:extLst>
+              <a:ext uri="{FF2B5EF4-FFF2-40B4-BE49-F238E27FC236}">
+                <a16:creationId xmlns:a16="http://schemas.microsoft.com/office/drawing/2014/main" id="{F71C9F0F-1445-4A79-94CF-E0FB03B6039D}"/>
+              </a:ext>
+            </a:extLst>
+          </p:cNvPr>
+          <p:cNvPicPr>
+            <a:picLocks noChangeAspect="1"/>
+          </p:cNvPicPr>
+          <p:nvPr/>
+        </p:nvPicPr>
+        <p:blipFill>
+          <a:blip r:embed="rId2"/>
+          <a:stretch>
+            <a:fillRect/>
+          </a:stretch>
+        </p:blipFill>
+        <p:spPr>
+          <a:xfrm>
+            <a:off x="0" y="0"/>
+            <a:ext cx="12192000" cy="6858000"/>
+          </a:xfrm>
+          <a:prstGeom prst="rect">
+            <a:avLst/>
+          </a:prstGeom>
+        </p:spPr>
+      </p:pic>
+    </p:spTree>
+    <p:extLst>
+      <p:ext uri="{BB962C8B-B14F-4D97-AF65-F5344CB8AC3E}">
+        <p14:creationId xmlns:p14="http://schemas.microsoft.com/office/powerpoint/2010/main" val="2906999491"/>
+      </p:ext>
+    </p:extLst>
+  </p:cSld>
+  <p:clrMapOvr>
+    <a:masterClrMapping/>
+  </p:clrMapOvr>
+</p:sld>
+</file>
+
+<file path=ppt/slides/slide7.xml><?xml version="1.0" encoding="utf-8"?>
+<p:sld xmlns:a="http://schemas.openxmlformats.org/drawingml/2006/main" xmlns:r="http://schemas.openxmlformats.org/officeDocument/2006/relationships" xmlns:p="http://schemas.openxmlformats.org/presentationml/2006/main">
+  <p:cSld>
+    <p:spTree>
+      <p:nvGrpSpPr>
+        <p:cNvPr id="1" name=""/>
+        <p:cNvGrpSpPr/>
+        <p:nvPr/>
+      </p:nvGrpSpPr>
+      <p:grpSpPr>
+        <a:xfrm>
+          <a:off x="0" y="0"/>
+          <a:ext cx="0" cy="0"/>
+          <a:chOff x="0" y="0"/>
+          <a:chExt cx="0" cy="0"/>
+        </a:xfrm>
+      </p:grpSpPr>
       <p:sp>
         <p:nvSpPr>
           <p:cNvPr id="2" name="TextBox 1">
@@ -4659,7 +4987,7 @@
         <p:spPr>
           <a:xfrm>
             <a:off x="187871" y="233082"/>
-            <a:ext cx="1163908" cy="584775"/>
+            <a:ext cx="4360296" cy="584775"/>
           </a:xfrm>
           <a:prstGeom prst="rect">
             <a:avLst/>
@@ -4682,7 +5010,7 @@
                   </a:outerShdw>
                 </a:effectLst>
               </a:rPr>
-              <a:t>META</a:t>
+              <a:t>META data management</a:t>
             </a:r>
           </a:p>
         </p:txBody>
@@ -4717,7 +5045,7 @@
           <a:p>
             <a:r>
               <a:rPr lang="en-US" dirty="0"/>
-              <a:t>Include:</a:t>
+              <a:t>Including:</a:t>
             </a:r>
           </a:p>
           <a:p>
@@ -4837,6 +5165,133 @@
     <a:masterClrMapping/>
   </p:clrMapOvr>
 </p:sld>
+</file>
+
+<file path=ppt/slides/slide8.xml><?xml version="1.0" encoding="utf-8"?>
+<p:sld xmlns:a="http://schemas.openxmlformats.org/drawingml/2006/main" xmlns:r="http://schemas.openxmlformats.org/officeDocument/2006/relationships" xmlns:p="http://schemas.openxmlformats.org/presentationml/2006/main">
+  <p:cSld>
+    <p:spTree>
+      <p:nvGrpSpPr>
+        <p:cNvPr id="1" name=""/>
+        <p:cNvGrpSpPr/>
+        <p:nvPr/>
+      </p:nvGrpSpPr>
+      <p:grpSpPr>
+        <a:xfrm>
+          <a:off x="0" y="0"/>
+          <a:ext cx="0" cy="0"/>
+          <a:chOff x="0" y="0"/>
+          <a:chExt cx="0" cy="0"/>
+        </a:xfrm>
+      </p:grpSpPr>
+      <p:sp>
+        <p:nvSpPr>
+          <p:cNvPr id="2" name="Title 1">
+            <a:extLst>
+              <a:ext uri="{FF2B5EF4-FFF2-40B4-BE49-F238E27FC236}">
+                <a16:creationId xmlns:a16="http://schemas.microsoft.com/office/drawing/2014/main" id="{6EEA6A82-AA78-4AE8-9D74-D20519FFEC84}"/>
+              </a:ext>
+            </a:extLst>
+          </p:cNvPr>
+          <p:cNvSpPr>
+            <a:spLocks noGrp="1"/>
+          </p:cNvSpPr>
+          <p:nvPr>
+            <p:ph type="title"/>
+          </p:nvPr>
+        </p:nvSpPr>
+        <p:spPr/>
+        <p:txBody>
+          <a:bodyPr/>
+          <a:lstStyle/>
+          <a:p>
+            <a:r>
+              <a:rPr lang="en-US" dirty="0"/>
+              <a:t>Next</a:t>
+            </a:r>
+          </a:p>
+        </p:txBody>
+      </p:sp>
+      <p:sp>
+        <p:nvSpPr>
+          <p:cNvPr id="3" name="Content Placeholder 2">
+            <a:extLst>
+              <a:ext uri="{FF2B5EF4-FFF2-40B4-BE49-F238E27FC236}">
+                <a16:creationId xmlns:a16="http://schemas.microsoft.com/office/drawing/2014/main" id="{AD3FA246-A3A0-409B-907F-23B2804320A8}"/>
+              </a:ext>
+            </a:extLst>
+          </p:cNvPr>
+          <p:cNvSpPr>
+            <a:spLocks noGrp="1"/>
+          </p:cNvSpPr>
+          <p:nvPr>
+            <p:ph idx="1"/>
+          </p:nvPr>
+        </p:nvSpPr>
+        <p:spPr/>
+        <p:txBody>
+          <a:bodyPr/>
+          <a:lstStyle/>
+          <a:p>
+            <a:r>
+              <a:rPr lang="en-US" dirty="0"/>
+              <a:t>Define HUB and SAT tables with META data approach.</a:t>
+            </a:r>
+          </a:p>
+        </p:txBody>
+      </p:sp>
+      <p:sp>
+        <p:nvSpPr>
+          <p:cNvPr id="4" name="TextBox 3">
+            <a:extLst>
+              <a:ext uri="{FF2B5EF4-FFF2-40B4-BE49-F238E27FC236}">
+                <a16:creationId xmlns:a16="http://schemas.microsoft.com/office/drawing/2014/main" id="{61743A8D-4BBF-4B9B-88FB-BC824339A0F1}"/>
+              </a:ext>
+            </a:extLst>
+          </p:cNvPr>
+          <p:cNvSpPr txBox="1"/>
+          <p:nvPr/>
+        </p:nvSpPr>
+        <p:spPr>
+          <a:xfrm>
+            <a:off x="1595922" y="5846544"/>
+            <a:ext cx="9000156" cy="646331"/>
+          </a:xfrm>
+          <a:prstGeom prst="rect">
+            <a:avLst/>
+          </a:prstGeom>
+          <a:noFill/>
+        </p:spPr>
+        <p:txBody>
+          <a:bodyPr wrap="none" rtlCol="0">
+            <a:spAutoFit/>
+          </a:bodyPr>
+          <a:lstStyle/>
+          <a:p>
+            <a:r>
+              <a:rPr lang="en-US" sz="3600" dirty="0"/>
+              <a:t>https://github.com/microsoftbi/PSA-Generator</a:t>
+            </a:r>
+          </a:p>
+        </p:txBody>
+      </p:sp>
+    </p:spTree>
+    <p:extLst>
+      <p:ext uri="{BB962C8B-B14F-4D97-AF65-F5344CB8AC3E}">
+        <p14:creationId xmlns:p14="http://schemas.microsoft.com/office/powerpoint/2010/main" val="2464823756"/>
+      </p:ext>
+    </p:extLst>
+  </p:cSld>
+  <p:clrMapOvr>
+    <a:masterClrMapping/>
+  </p:clrMapOvr>
+</p:sld>
+</file>
+
+<file path=ppt/tags/tag1.xml><?xml version="1.0" encoding="utf-8"?>
+<p:tagLst xmlns:a="http://schemas.openxmlformats.org/drawingml/2006/main" xmlns:r="http://schemas.openxmlformats.org/officeDocument/2006/relationships" xmlns:p="http://schemas.openxmlformats.org/presentationml/2006/main">
+  <p:tag name="THINKCELLSHAPEDONOTDELETE" val="thinkcellActiveDocDoNotDelete"/>
+</p:tagLst>
 </file>
 
 <file path=ppt/theme/theme1.xml><?xml version="1.0" encoding="utf-8"?>

</xml_diff>